<commit_message>
[v1/develop] FFT, interpolation functions added, fcomplex::to_string() function added
</commit_message>
<xml_diff>
--- a/doc/DSP_TemplateToolBox.pptx
+++ b/doc/DSP_TemplateToolBox.pptx
@@ -7,11 +7,12 @@
   <p:sldIdLst>
     <p:sldId id="256" r:id="rId2"/>
     <p:sldId id="257" r:id="rId3"/>
-    <p:sldId id="262" r:id="rId4"/>
-    <p:sldId id="259" r:id="rId5"/>
-    <p:sldId id="263" r:id="rId6"/>
-    <p:sldId id="261" r:id="rId7"/>
-    <p:sldId id="258" r:id="rId8"/>
+    <p:sldId id="264" r:id="rId4"/>
+    <p:sldId id="262" r:id="rId5"/>
+    <p:sldId id="259" r:id="rId6"/>
+    <p:sldId id="263" r:id="rId7"/>
+    <p:sldId id="261" r:id="rId8"/>
+    <p:sldId id="258" r:id="rId9"/>
   </p:sldIdLst>
   <p:sldSz cx="12192000" cy="6858000"/>
   <p:notesSz cx="6858000" cy="9144000"/>
@@ -265,7 +266,7 @@
           <a:p>
             <a:fld id="{C27AACBF-6788-4C76-BD29-5A01919E5028}" type="datetimeFigureOut">
               <a:rPr lang="ru-RU" smtClean="0"/>
-              <a:t>13.04.2022</a:t>
+              <a:t>04.07.2022</a:t>
             </a:fld>
             <a:endParaRPr lang="ru-RU"/>
           </a:p>
@@ -463,7 +464,7 @@
           <a:p>
             <a:fld id="{C27AACBF-6788-4C76-BD29-5A01919E5028}" type="datetimeFigureOut">
               <a:rPr lang="ru-RU" smtClean="0"/>
-              <a:t>13.04.2022</a:t>
+              <a:t>04.07.2022</a:t>
             </a:fld>
             <a:endParaRPr lang="ru-RU"/>
           </a:p>
@@ -671,7 +672,7 @@
           <a:p>
             <a:fld id="{C27AACBF-6788-4C76-BD29-5A01919E5028}" type="datetimeFigureOut">
               <a:rPr lang="ru-RU" smtClean="0"/>
-              <a:t>13.04.2022</a:t>
+              <a:t>04.07.2022</a:t>
             </a:fld>
             <a:endParaRPr lang="ru-RU"/>
           </a:p>
@@ -869,7 +870,7 @@
           <a:p>
             <a:fld id="{C27AACBF-6788-4C76-BD29-5A01919E5028}" type="datetimeFigureOut">
               <a:rPr lang="ru-RU" smtClean="0"/>
-              <a:t>13.04.2022</a:t>
+              <a:t>04.07.2022</a:t>
             </a:fld>
             <a:endParaRPr lang="ru-RU"/>
           </a:p>
@@ -1144,7 +1145,7 @@
           <a:p>
             <a:fld id="{C27AACBF-6788-4C76-BD29-5A01919E5028}" type="datetimeFigureOut">
               <a:rPr lang="ru-RU" smtClean="0"/>
-              <a:t>13.04.2022</a:t>
+              <a:t>04.07.2022</a:t>
             </a:fld>
             <a:endParaRPr lang="ru-RU"/>
           </a:p>
@@ -1409,7 +1410,7 @@
           <a:p>
             <a:fld id="{C27AACBF-6788-4C76-BD29-5A01919E5028}" type="datetimeFigureOut">
               <a:rPr lang="ru-RU" smtClean="0"/>
-              <a:t>13.04.2022</a:t>
+              <a:t>04.07.2022</a:t>
             </a:fld>
             <a:endParaRPr lang="ru-RU"/>
           </a:p>
@@ -1821,7 +1822,7 @@
           <a:p>
             <a:fld id="{C27AACBF-6788-4C76-BD29-5A01919E5028}" type="datetimeFigureOut">
               <a:rPr lang="ru-RU" smtClean="0"/>
-              <a:t>13.04.2022</a:t>
+              <a:t>04.07.2022</a:t>
             </a:fld>
             <a:endParaRPr lang="ru-RU"/>
           </a:p>
@@ -1962,7 +1963,7 @@
           <a:p>
             <a:fld id="{C27AACBF-6788-4C76-BD29-5A01919E5028}" type="datetimeFigureOut">
               <a:rPr lang="ru-RU" smtClean="0"/>
-              <a:t>13.04.2022</a:t>
+              <a:t>04.07.2022</a:t>
             </a:fld>
             <a:endParaRPr lang="ru-RU"/>
           </a:p>
@@ -2075,7 +2076,7 @@
           <a:p>
             <a:fld id="{C27AACBF-6788-4C76-BD29-5A01919E5028}" type="datetimeFigureOut">
               <a:rPr lang="ru-RU" smtClean="0"/>
-              <a:t>13.04.2022</a:t>
+              <a:t>04.07.2022</a:t>
             </a:fld>
             <a:endParaRPr lang="ru-RU"/>
           </a:p>
@@ -2386,7 +2387,7 @@
           <a:p>
             <a:fld id="{C27AACBF-6788-4C76-BD29-5A01919E5028}" type="datetimeFigureOut">
               <a:rPr lang="ru-RU" smtClean="0"/>
-              <a:t>13.04.2022</a:t>
+              <a:t>04.07.2022</a:t>
             </a:fld>
             <a:endParaRPr lang="ru-RU"/>
           </a:p>
@@ -2674,7 +2675,7 @@
           <a:p>
             <a:fld id="{C27AACBF-6788-4C76-BD29-5A01919E5028}" type="datetimeFigureOut">
               <a:rPr lang="ru-RU" smtClean="0"/>
-              <a:t>13.04.2022</a:t>
+              <a:t>04.07.2022</a:t>
             </a:fld>
             <a:endParaRPr lang="ru-RU"/>
           </a:p>
@@ -2915,7 +2916,7 @@
           <a:p>
             <a:fld id="{C27AACBF-6788-4C76-BD29-5A01919E5028}" type="datetimeFigureOut">
               <a:rPr lang="ru-RU" smtClean="0"/>
-              <a:t>13.04.2022</a:t>
+              <a:t>04.07.2022</a:t>
             </a:fld>
             <a:endParaRPr lang="ru-RU"/>
           </a:p>
@@ -3577,7 +3578,7 @@
           <p:cNvPr id="2" name="Заголовок 1">
             <a:extLst>
               <a:ext uri="{FF2B5EF4-FFF2-40B4-BE49-F238E27FC236}">
-                <a16:creationId xmlns:a16="http://schemas.microsoft.com/office/drawing/2014/main" id="{C7DAD76B-FAC2-40B1-B88E-CFB2D2F6CC1A}"/>
+                <a16:creationId xmlns:a16="http://schemas.microsoft.com/office/drawing/2014/main" id="{3D77EC2C-C6A1-78B5-E626-243DBDCCD0C0}"/>
               </a:ext>
             </a:extLst>
           </p:cNvPr>
@@ -3596,13 +3597,102 @@
             <a:pPr algn="ctr"/>
             <a:r>
               <a:rPr lang="ru-RU" dirty="0"/>
+              <a:t>Принцип построения библиотеки</a:t>
+            </a:r>
+          </a:p>
+        </p:txBody>
+      </p:sp>
+      <p:pic>
+        <p:nvPicPr>
+          <p:cNvPr id="17" name="Рисунок 16">
+            <a:extLst>
+              <a:ext uri="{FF2B5EF4-FFF2-40B4-BE49-F238E27FC236}">
+                <a16:creationId xmlns:a16="http://schemas.microsoft.com/office/drawing/2014/main" id="{9E5E78CF-5A4E-A086-3DAD-C970FE5F5580}"/>
+              </a:ext>
+            </a:extLst>
+          </p:cNvPr>
+          <p:cNvPicPr>
+            <a:picLocks noChangeAspect="1"/>
+          </p:cNvPicPr>
+          <p:nvPr/>
+        </p:nvPicPr>
+        <p:blipFill>
+          <a:blip r:embed="rId2"/>
+          <a:stretch>
+            <a:fillRect/>
+          </a:stretch>
+        </p:blipFill>
+        <p:spPr>
+          <a:xfrm>
+            <a:off x="1211580" y="1575565"/>
+            <a:ext cx="10142220" cy="4434840"/>
+          </a:xfrm>
+          <a:prstGeom prst="rect">
+            <a:avLst/>
+          </a:prstGeom>
+        </p:spPr>
+      </p:pic>
+    </p:spTree>
+    <p:extLst>
+      <p:ext uri="{BB962C8B-B14F-4D97-AF65-F5344CB8AC3E}">
+        <p14:creationId xmlns:p14="http://schemas.microsoft.com/office/powerpoint/2010/main" val="630996872"/>
+      </p:ext>
+    </p:extLst>
+  </p:cSld>
+  <p:clrMapOvr>
+    <a:masterClrMapping/>
+  </p:clrMapOvr>
+</p:sld>
+</file>
+
+<file path=ppt/slides/slide4.xml><?xml version="1.0" encoding="utf-8"?>
+<p:sld xmlns:a="http://schemas.openxmlformats.org/drawingml/2006/main" xmlns:r="http://schemas.openxmlformats.org/officeDocument/2006/relationships" xmlns:p="http://schemas.openxmlformats.org/presentationml/2006/main">
+  <p:cSld>
+    <p:spTree>
+      <p:nvGrpSpPr>
+        <p:cNvPr id="1" name=""/>
+        <p:cNvGrpSpPr/>
+        <p:nvPr/>
+      </p:nvGrpSpPr>
+      <p:grpSpPr>
+        <a:xfrm>
+          <a:off x="0" y="0"/>
+          <a:ext cx="0" cy="0"/>
+          <a:chOff x="0" y="0"/>
+          <a:chExt cx="0" cy="0"/>
+        </a:xfrm>
+      </p:grpSpPr>
+      <p:sp>
+        <p:nvSpPr>
+          <p:cNvPr id="2" name="Заголовок 1">
+            <a:extLst>
+              <a:ext uri="{FF2B5EF4-FFF2-40B4-BE49-F238E27FC236}">
+                <a16:creationId xmlns:a16="http://schemas.microsoft.com/office/drawing/2014/main" id="{C7DAD76B-FAC2-40B1-B88E-CFB2D2F6CC1A}"/>
+              </a:ext>
+            </a:extLst>
+          </p:cNvPr>
+          <p:cNvSpPr>
+            <a:spLocks noGrp="1"/>
+          </p:cNvSpPr>
+          <p:nvPr>
+            <p:ph type="title"/>
+          </p:nvPr>
+        </p:nvSpPr>
+        <p:spPr/>
+        <p:txBody>
+          <a:bodyPr/>
+          <a:lstStyle/>
+          <a:p>
+            <a:pPr algn="ctr"/>
+            <a:r>
+              <a:rPr lang="ru-RU" dirty="0"/>
               <a:t>Библиотечные модели КИХ и БИХ фильтров</a:t>
             </a:r>
           </a:p>
         </p:txBody>
       </p:sp>
-      <mc:AlternateContent xmlns:mc="http://schemas.openxmlformats.org/markup-compatibility/2006">
-        <mc:Choice xmlns:a14="http://schemas.microsoft.com/office/drawing/2010/main" Requires="a14">
+      <mc:AlternateContent xmlns:mc="http://schemas.openxmlformats.org/markup-compatibility/2006" xmlns:a14="http://schemas.microsoft.com/office/drawing/2010/main">
+        <mc:Choice Requires="a14">
           <p:sp>
             <p:nvSpPr>
               <p:cNvPr id="3" name="Объект 2">
@@ -4314,7 +4404,7 @@
             </p:txBody>
           </p:sp>
         </mc:Choice>
-        <mc:Fallback>
+        <mc:Fallback xmlns="">
           <p:sp>
             <p:nvSpPr>
               <p:cNvPr id="3" name="Объект 2">
@@ -4367,96 +4457,6 @@
 </p:sld>
 </file>
 
-<file path=ppt/slides/slide4.xml><?xml version="1.0" encoding="utf-8"?>
-<p:sld xmlns:a="http://schemas.openxmlformats.org/drawingml/2006/main" xmlns:r="http://schemas.openxmlformats.org/officeDocument/2006/relationships" xmlns:p="http://schemas.openxmlformats.org/presentationml/2006/main">
-  <p:cSld>
-    <p:spTree>
-      <p:nvGrpSpPr>
-        <p:cNvPr id="1" name=""/>
-        <p:cNvGrpSpPr/>
-        <p:nvPr/>
-      </p:nvGrpSpPr>
-      <p:grpSpPr>
-        <a:xfrm>
-          <a:off x="0" y="0"/>
-          <a:ext cx="0" cy="0"/>
-          <a:chOff x="0" y="0"/>
-          <a:chExt cx="0" cy="0"/>
-        </a:xfrm>
-      </p:grpSpPr>
-      <p:sp>
-        <p:nvSpPr>
-          <p:cNvPr id="2" name="Заголовок 1">
-            <a:extLst>
-              <a:ext uri="{FF2B5EF4-FFF2-40B4-BE49-F238E27FC236}">
-                <a16:creationId xmlns:a16="http://schemas.microsoft.com/office/drawing/2014/main" id="{0D2119E8-D8F5-42C8-B08A-67FF8AB377F3}"/>
-              </a:ext>
-            </a:extLst>
-          </p:cNvPr>
-          <p:cNvSpPr>
-            <a:spLocks noGrp="1"/>
-          </p:cNvSpPr>
-          <p:nvPr>
-            <p:ph type="title"/>
-          </p:nvPr>
-        </p:nvSpPr>
-        <p:spPr/>
-        <p:txBody>
-          <a:bodyPr/>
-          <a:lstStyle/>
-          <a:p>
-            <a:r>
-              <a:rPr lang="ru-RU" dirty="0"/>
-              <a:t>Библиотечная модель КИХ фильтра</a:t>
-            </a:r>
-          </a:p>
-        </p:txBody>
-      </p:sp>
-      <p:sp>
-        <p:nvSpPr>
-          <p:cNvPr id="3" name="Объект 2">
-            <a:extLst>
-              <a:ext uri="{FF2B5EF4-FFF2-40B4-BE49-F238E27FC236}">
-                <a16:creationId xmlns:a16="http://schemas.microsoft.com/office/drawing/2014/main" id="{3444A8FB-8DF5-4B08-819C-2D812BD402F2}"/>
-              </a:ext>
-            </a:extLst>
-          </p:cNvPr>
-          <p:cNvSpPr>
-            <a:spLocks noGrp="1"/>
-          </p:cNvSpPr>
-          <p:nvPr>
-            <p:ph idx="1"/>
-          </p:nvPr>
-        </p:nvSpPr>
-        <p:spPr/>
-        <p:txBody>
-          <a:bodyPr/>
-          <a:lstStyle/>
-          <a:p>
-            <a:pPr marL="0" indent="0">
-              <a:buNone/>
-            </a:pPr>
-            <a:endParaRPr lang="ru-RU" i="1" dirty="0">
-              <a:latin typeface="Cambria Math" panose="02040503050406030204" pitchFamily="18" charset="0"/>
-              <a:ea typeface="Calibri" panose="020F0502020204030204" pitchFamily="34" charset="0"/>
-              <a:cs typeface="Times New Roman" panose="02020603050405020304" pitchFamily="18" charset="0"/>
-            </a:endParaRPr>
-          </a:p>
-        </p:txBody>
-      </p:sp>
-    </p:spTree>
-    <p:extLst>
-      <p:ext uri="{BB962C8B-B14F-4D97-AF65-F5344CB8AC3E}">
-        <p14:creationId xmlns:p14="http://schemas.microsoft.com/office/powerpoint/2010/main" val="2940452693"/>
-      </p:ext>
-    </p:extLst>
-  </p:cSld>
-  <p:clrMapOvr>
-    <a:masterClrMapping/>
-  </p:clrMapOvr>
-</p:sld>
-</file>
-
 <file path=ppt/slides/slide5.xml><?xml version="1.0" encoding="utf-8"?>
 <p:sld xmlns:a="http://schemas.openxmlformats.org/drawingml/2006/main" xmlns:r="http://schemas.openxmlformats.org/officeDocument/2006/relationships" xmlns:p="http://schemas.openxmlformats.org/presentationml/2006/main">
   <p:cSld>
@@ -4479,6 +4479,597 @@
           <p:cNvPr id="2" name="Заголовок 1">
             <a:extLst>
               <a:ext uri="{FF2B5EF4-FFF2-40B4-BE49-F238E27FC236}">
+                <a16:creationId xmlns:a16="http://schemas.microsoft.com/office/drawing/2014/main" id="{0D2119E8-D8F5-42C8-B08A-67FF8AB377F3}"/>
+              </a:ext>
+            </a:extLst>
+          </p:cNvPr>
+          <p:cNvSpPr>
+            <a:spLocks noGrp="1"/>
+          </p:cNvSpPr>
+          <p:nvPr>
+            <p:ph type="title"/>
+          </p:nvPr>
+        </p:nvSpPr>
+        <p:spPr/>
+        <p:txBody>
+          <a:bodyPr/>
+          <a:lstStyle/>
+          <a:p>
+            <a:pPr algn="ctr"/>
+            <a:r>
+              <a:rPr lang="ru-RU" dirty="0"/>
+              <a:t>Библиотечная модель БИХ фильтра</a:t>
+            </a:r>
+          </a:p>
+        </p:txBody>
+      </p:sp>
+      <mc:AlternateContent xmlns:mc="http://schemas.openxmlformats.org/markup-compatibility/2006">
+        <mc:Choice xmlns:a14="http://schemas.microsoft.com/office/drawing/2010/main" Requires="a14">
+          <p:sp>
+            <p:nvSpPr>
+              <p:cNvPr id="3" name="Объект 2">
+                <a:extLst>
+                  <a:ext uri="{FF2B5EF4-FFF2-40B4-BE49-F238E27FC236}">
+                    <a16:creationId xmlns:a16="http://schemas.microsoft.com/office/drawing/2014/main" id="{3444A8FB-8DF5-4B08-819C-2D812BD402F2}"/>
+                  </a:ext>
+                </a:extLst>
+              </p:cNvPr>
+              <p:cNvSpPr>
+                <a:spLocks noGrp="1"/>
+              </p:cNvSpPr>
+              <p:nvPr>
+                <p:ph idx="1"/>
+              </p:nvPr>
+            </p:nvSpPr>
+            <p:spPr/>
+            <p:txBody>
+              <a:bodyPr/>
+              <a:lstStyle/>
+              <a:p>
+                <a:pPr marL="0" indent="0">
+                  <a:buNone/>
+                </a:pPr>
+                <a:endParaRPr lang="ru-RU" sz="2800" i="1" dirty="0">
+                  <a:effectLst/>
+                  <a:latin typeface="Cambria Math" panose="02040503050406030204" pitchFamily="18" charset="0"/>
+                  <a:ea typeface="Calibri" panose="020F0502020204030204" pitchFamily="34" charset="0"/>
+                  <a:cs typeface="Times New Roman" panose="02020603050405020304" pitchFamily="18" charset="0"/>
+                </a:endParaRPr>
+              </a:p>
+              <a:p>
+                <a:pPr marL="0" indent="0">
+                  <a:buNone/>
+                </a:pPr>
+                <a14:m>
+                  <m:oMathPara xmlns:m="http://schemas.openxmlformats.org/officeDocument/2006/math">
+                    <m:oMathParaPr>
+                      <m:jc m:val="center"/>
+                    </m:oMathParaPr>
+                    <m:oMath xmlns:m="http://schemas.openxmlformats.org/officeDocument/2006/math">
+                      <m:r>
+                        <a:rPr lang="ru-RU" sz="2800" i="1" smtClean="0">
+                          <a:effectLst/>
+                          <a:latin typeface="Cambria Math" panose="02040503050406030204" pitchFamily="18" charset="0"/>
+                          <a:ea typeface="Calibri" panose="020F0502020204030204" pitchFamily="34" charset="0"/>
+                          <a:cs typeface="Times New Roman" panose="02020603050405020304" pitchFamily="18" charset="0"/>
+                        </a:rPr>
+                        <m:t>𝑊</m:t>
+                      </m:r>
+                      <m:d>
+                        <m:dPr>
+                          <m:ctrlPr>
+                            <a:rPr lang="ru-RU" sz="2800" i="1">
+                              <a:effectLst/>
+                              <a:latin typeface="Cambria Math" panose="02040503050406030204" pitchFamily="18" charset="0"/>
+                              <a:ea typeface="Calibri" panose="020F0502020204030204" pitchFamily="34" charset="0"/>
+                              <a:cs typeface="Times New Roman" panose="02020603050405020304" pitchFamily="18" charset="0"/>
+                            </a:rPr>
+                          </m:ctrlPr>
+                        </m:dPr>
+                        <m:e>
+                          <m:r>
+                            <a:rPr lang="ru-RU" sz="2800" i="1">
+                              <a:effectLst/>
+                              <a:latin typeface="Cambria Math" panose="02040503050406030204" pitchFamily="18" charset="0"/>
+                              <a:ea typeface="Calibri" panose="020F0502020204030204" pitchFamily="34" charset="0"/>
+                              <a:cs typeface="Times New Roman" panose="02020603050405020304" pitchFamily="18" charset="0"/>
+                            </a:rPr>
+                            <m:t>𝑧</m:t>
+                          </m:r>
+                        </m:e>
+                      </m:d>
+                      <m:r>
+                        <a:rPr lang="ru-RU" sz="2800" i="1">
+                          <a:effectLst/>
+                          <a:latin typeface="Cambria Math" panose="02040503050406030204" pitchFamily="18" charset="0"/>
+                          <a:ea typeface="Calibri" panose="020F0502020204030204" pitchFamily="34" charset="0"/>
+                          <a:cs typeface="Times New Roman" panose="02020603050405020304" pitchFamily="18" charset="0"/>
+                        </a:rPr>
+                        <m:t>=</m:t>
+                      </m:r>
+                      <m:nary>
+                        <m:naryPr>
+                          <m:chr m:val="∏"/>
+                          <m:limLoc m:val="undOvr"/>
+                          <m:ctrlPr>
+                            <a:rPr lang="ru-RU" sz="2800" i="1">
+                              <a:effectLst/>
+                              <a:latin typeface="Cambria Math" panose="02040503050406030204" pitchFamily="18" charset="0"/>
+                              <a:ea typeface="Calibri" panose="020F0502020204030204" pitchFamily="34" charset="0"/>
+                              <a:cs typeface="Times New Roman" panose="02020603050405020304" pitchFamily="18" charset="0"/>
+                            </a:rPr>
+                          </m:ctrlPr>
+                        </m:naryPr>
+                        <m:sub>
+                          <m:r>
+                            <a:rPr lang="ru-RU" sz="2800" i="1">
+                              <a:effectLst/>
+                              <a:latin typeface="Cambria Math" panose="02040503050406030204" pitchFamily="18" charset="0"/>
+                              <a:ea typeface="Calibri" panose="020F0502020204030204" pitchFamily="34" charset="0"/>
+                              <a:cs typeface="Times New Roman" panose="02020603050405020304" pitchFamily="18" charset="0"/>
+                            </a:rPr>
+                            <m:t>𝑛</m:t>
+                          </m:r>
+                          <m:r>
+                            <a:rPr lang="ru-RU" sz="2800" i="1">
+                              <a:effectLst/>
+                              <a:latin typeface="Cambria Math" panose="02040503050406030204" pitchFamily="18" charset="0"/>
+                              <a:ea typeface="Calibri" panose="020F0502020204030204" pitchFamily="34" charset="0"/>
+                              <a:cs typeface="Times New Roman" panose="02020603050405020304" pitchFamily="18" charset="0"/>
+                            </a:rPr>
+                            <m:t>=0</m:t>
+                          </m:r>
+                        </m:sub>
+                        <m:sup>
+                          <m:r>
+                            <a:rPr lang="ru-RU" sz="2800" i="1">
+                              <a:effectLst/>
+                              <a:latin typeface="Cambria Math" panose="02040503050406030204" pitchFamily="18" charset="0"/>
+                              <a:ea typeface="Calibri" panose="020F0502020204030204" pitchFamily="34" charset="0"/>
+                              <a:cs typeface="Times New Roman" panose="02020603050405020304" pitchFamily="18" charset="0"/>
+                            </a:rPr>
+                            <m:t>𝑁</m:t>
+                          </m:r>
+                        </m:sup>
+                        <m:e>
+                          <m:sSub>
+                            <m:sSubPr>
+                              <m:ctrlPr>
+                                <a:rPr lang="ru-RU" sz="2800" i="1">
+                                  <a:effectLst/>
+                                  <a:latin typeface="Cambria Math" panose="02040503050406030204" pitchFamily="18" charset="0"/>
+                                  <a:ea typeface="Calibri" panose="020F0502020204030204" pitchFamily="34" charset="0"/>
+                                  <a:cs typeface="Times New Roman" panose="02020603050405020304" pitchFamily="18" charset="0"/>
+                                </a:rPr>
+                              </m:ctrlPr>
+                            </m:sSubPr>
+                            <m:e>
+                              <m:r>
+                                <a:rPr lang="ru-RU" sz="2800" i="1">
+                                  <a:effectLst/>
+                                  <a:latin typeface="Cambria Math" panose="02040503050406030204" pitchFamily="18" charset="0"/>
+                                  <a:ea typeface="Calibri" panose="020F0502020204030204" pitchFamily="34" charset="0"/>
+                                  <a:cs typeface="Times New Roman" panose="02020603050405020304" pitchFamily="18" charset="0"/>
+                                </a:rPr>
+                                <m:t>𝐺</m:t>
+                              </m:r>
+                            </m:e>
+                            <m:sub>
+                              <m:r>
+                                <a:rPr lang="en-US" sz="2800" b="0" i="1" smtClean="0">
+                                  <a:effectLst/>
+                                  <a:latin typeface="Cambria Math" panose="02040503050406030204" pitchFamily="18" charset="0"/>
+                                  <a:ea typeface="Calibri" panose="020F0502020204030204" pitchFamily="34" charset="0"/>
+                                  <a:cs typeface="Times New Roman" panose="02020603050405020304" pitchFamily="18" charset="0"/>
+                                </a:rPr>
+                                <m:t>𝑛</m:t>
+                              </m:r>
+                            </m:sub>
+                          </m:sSub>
+                          <m:r>
+                            <a:rPr lang="ru-RU" sz="2800" i="1">
+                              <a:effectLst/>
+                              <a:latin typeface="Cambria Math" panose="02040503050406030204" pitchFamily="18" charset="0"/>
+                              <a:ea typeface="Calibri" panose="020F0502020204030204" pitchFamily="34" charset="0"/>
+                              <a:cs typeface="Times New Roman" panose="02020603050405020304" pitchFamily="18" charset="0"/>
+                            </a:rPr>
+                            <m:t>∙</m:t>
+                          </m:r>
+                          <m:f>
+                            <m:fPr>
+                              <m:ctrlPr>
+                                <a:rPr lang="ru-RU" sz="2800" i="1">
+                                  <a:effectLst/>
+                                  <a:latin typeface="Cambria Math" panose="02040503050406030204" pitchFamily="18" charset="0"/>
+                                  <a:ea typeface="Calibri" panose="020F0502020204030204" pitchFamily="34" charset="0"/>
+                                  <a:cs typeface="Times New Roman" panose="02020603050405020304" pitchFamily="18" charset="0"/>
+                                </a:rPr>
+                              </m:ctrlPr>
+                            </m:fPr>
+                            <m:num>
+                              <m:nary>
+                                <m:naryPr>
+                                  <m:chr m:val="∑"/>
+                                  <m:limLoc m:val="undOvr"/>
+                                  <m:ctrlPr>
+                                    <a:rPr lang="ru-RU" sz="2800" i="1">
+                                      <a:effectLst/>
+                                      <a:latin typeface="Cambria Math" panose="02040503050406030204" pitchFamily="18" charset="0"/>
+                                      <a:ea typeface="Calibri" panose="020F0502020204030204" pitchFamily="34" charset="0"/>
+                                      <a:cs typeface="Times New Roman" panose="02020603050405020304" pitchFamily="18" charset="0"/>
+                                    </a:rPr>
+                                  </m:ctrlPr>
+                                </m:naryPr>
+                                <m:sub>
+                                  <m:r>
+                                    <a:rPr lang="ru-RU" sz="2800" i="1">
+                                      <a:effectLst/>
+                                      <a:latin typeface="Cambria Math" panose="02040503050406030204" pitchFamily="18" charset="0"/>
+                                      <a:ea typeface="Calibri" panose="020F0502020204030204" pitchFamily="34" charset="0"/>
+                                      <a:cs typeface="Times New Roman" panose="02020603050405020304" pitchFamily="18" charset="0"/>
+                                    </a:rPr>
+                                    <m:t>𝑚</m:t>
+                                  </m:r>
+                                  <m:r>
+                                    <a:rPr lang="ru-RU" sz="2800" i="1">
+                                      <a:effectLst/>
+                                      <a:latin typeface="Cambria Math" panose="02040503050406030204" pitchFamily="18" charset="0"/>
+                                      <a:ea typeface="Calibri" panose="020F0502020204030204" pitchFamily="34" charset="0"/>
+                                      <a:cs typeface="Times New Roman" panose="02020603050405020304" pitchFamily="18" charset="0"/>
+                                    </a:rPr>
+                                    <m:t>=0</m:t>
+                                  </m:r>
+                                </m:sub>
+                                <m:sup>
+                                  <m:r>
+                                    <a:rPr lang="ru-RU" sz="2800" i="1">
+                                      <a:effectLst/>
+                                      <a:latin typeface="Cambria Math" panose="02040503050406030204" pitchFamily="18" charset="0"/>
+                                      <a:ea typeface="Calibri" panose="020F0502020204030204" pitchFamily="34" charset="0"/>
+                                      <a:cs typeface="Times New Roman" panose="02020603050405020304" pitchFamily="18" charset="0"/>
+                                    </a:rPr>
+                                    <m:t>𝑀</m:t>
+                                  </m:r>
+                                </m:sup>
+                                <m:e>
+                                  <m:sSub>
+                                    <m:sSubPr>
+                                      <m:ctrlPr>
+                                        <a:rPr lang="ru-RU" sz="2800" i="1">
+                                          <a:effectLst/>
+                                          <a:latin typeface="Cambria Math" panose="02040503050406030204" pitchFamily="18" charset="0"/>
+                                          <a:ea typeface="Calibri" panose="020F0502020204030204" pitchFamily="34" charset="0"/>
+                                          <a:cs typeface="Times New Roman" panose="02020603050405020304" pitchFamily="18" charset="0"/>
+                                        </a:rPr>
+                                      </m:ctrlPr>
+                                    </m:sSubPr>
+                                    <m:e>
+                                      <m:r>
+                                        <a:rPr lang="ru-RU" sz="2800" i="1">
+                                          <a:effectLst/>
+                                          <a:latin typeface="Cambria Math" panose="02040503050406030204" pitchFamily="18" charset="0"/>
+                                          <a:ea typeface="Calibri" panose="020F0502020204030204" pitchFamily="34" charset="0"/>
+                                          <a:cs typeface="Times New Roman" panose="02020603050405020304" pitchFamily="18" charset="0"/>
+                                        </a:rPr>
+                                        <m:t>𝑎</m:t>
+                                      </m:r>
+                                    </m:e>
+                                    <m:sub>
+                                      <m:r>
+                                        <a:rPr lang="ru-RU" sz="2800" i="1">
+                                          <a:effectLst/>
+                                          <a:latin typeface="Cambria Math" panose="02040503050406030204" pitchFamily="18" charset="0"/>
+                                          <a:ea typeface="Calibri" panose="020F0502020204030204" pitchFamily="34" charset="0"/>
+                                          <a:cs typeface="Times New Roman" panose="02020603050405020304" pitchFamily="18" charset="0"/>
+                                        </a:rPr>
+                                        <m:t>𝑚</m:t>
+                                      </m:r>
+                                      <m:r>
+                                        <a:rPr lang="en-US" sz="2800" b="0" i="1" smtClean="0">
+                                          <a:effectLst/>
+                                          <a:latin typeface="Cambria Math" panose="02040503050406030204" pitchFamily="18" charset="0"/>
+                                          <a:ea typeface="Calibri" panose="020F0502020204030204" pitchFamily="34" charset="0"/>
+                                          <a:cs typeface="Times New Roman" panose="02020603050405020304" pitchFamily="18" charset="0"/>
+                                        </a:rPr>
+                                        <m:t>𝑛</m:t>
+                                      </m:r>
+                                    </m:sub>
+                                  </m:sSub>
+                                  <m:r>
+                                    <a:rPr lang="ru-RU" sz="2800" i="1">
+                                      <a:effectLst/>
+                                      <a:latin typeface="Cambria Math" panose="02040503050406030204" pitchFamily="18" charset="0"/>
+                                      <a:ea typeface="Calibri" panose="020F0502020204030204" pitchFamily="34" charset="0"/>
+                                      <a:cs typeface="Times New Roman" panose="02020603050405020304" pitchFamily="18" charset="0"/>
+                                    </a:rPr>
+                                    <m:t>∙</m:t>
+                                  </m:r>
+                                  <m:sSup>
+                                    <m:sSupPr>
+                                      <m:ctrlPr>
+                                        <a:rPr lang="ru-RU" sz="2800" i="1">
+                                          <a:effectLst/>
+                                          <a:latin typeface="Cambria Math" panose="02040503050406030204" pitchFamily="18" charset="0"/>
+                                          <a:ea typeface="Calibri" panose="020F0502020204030204" pitchFamily="34" charset="0"/>
+                                          <a:cs typeface="Times New Roman" panose="02020603050405020304" pitchFamily="18" charset="0"/>
+                                        </a:rPr>
+                                      </m:ctrlPr>
+                                    </m:sSupPr>
+                                    <m:e>
+                                      <m:r>
+                                        <a:rPr lang="ru-RU" sz="2800" i="1">
+                                          <a:effectLst/>
+                                          <a:latin typeface="Cambria Math" panose="02040503050406030204" pitchFamily="18" charset="0"/>
+                                          <a:ea typeface="Calibri" panose="020F0502020204030204" pitchFamily="34" charset="0"/>
+                                          <a:cs typeface="Times New Roman" panose="02020603050405020304" pitchFamily="18" charset="0"/>
+                                        </a:rPr>
+                                        <m:t>𝑧</m:t>
+                                      </m:r>
+                                    </m:e>
+                                    <m:sup>
+                                      <m:r>
+                                        <a:rPr lang="ru-RU" sz="2800" i="1">
+                                          <a:effectLst/>
+                                          <a:latin typeface="Cambria Math" panose="02040503050406030204" pitchFamily="18" charset="0"/>
+                                          <a:ea typeface="Calibri" panose="020F0502020204030204" pitchFamily="34" charset="0"/>
+                                          <a:cs typeface="Times New Roman" panose="02020603050405020304" pitchFamily="18" charset="0"/>
+                                        </a:rPr>
+                                        <m:t>−</m:t>
+                                      </m:r>
+                                      <m:r>
+                                        <a:rPr lang="ru-RU" sz="2800" i="1">
+                                          <a:effectLst/>
+                                          <a:latin typeface="Cambria Math" panose="02040503050406030204" pitchFamily="18" charset="0"/>
+                                          <a:ea typeface="Calibri" panose="020F0502020204030204" pitchFamily="34" charset="0"/>
+                                          <a:cs typeface="Times New Roman" panose="02020603050405020304" pitchFamily="18" charset="0"/>
+                                        </a:rPr>
+                                        <m:t>𝑚</m:t>
+                                      </m:r>
+                                    </m:sup>
+                                  </m:sSup>
+                                </m:e>
+                              </m:nary>
+                            </m:num>
+                            <m:den>
+                              <m:nary>
+                                <m:naryPr>
+                                  <m:chr m:val="∑"/>
+                                  <m:limLoc m:val="undOvr"/>
+                                  <m:ctrlPr>
+                                    <a:rPr lang="ru-RU" sz="2800" i="1">
+                                      <a:effectLst/>
+                                      <a:latin typeface="Cambria Math" panose="02040503050406030204" pitchFamily="18" charset="0"/>
+                                      <a:ea typeface="Calibri" panose="020F0502020204030204" pitchFamily="34" charset="0"/>
+                                      <a:cs typeface="Times New Roman" panose="02020603050405020304" pitchFamily="18" charset="0"/>
+                                    </a:rPr>
+                                  </m:ctrlPr>
+                                </m:naryPr>
+                                <m:sub>
+                                  <m:r>
+                                    <a:rPr lang="ru-RU" sz="2800" i="1">
+                                      <a:effectLst/>
+                                      <a:latin typeface="Cambria Math" panose="02040503050406030204" pitchFamily="18" charset="0"/>
+                                      <a:ea typeface="Calibri" panose="020F0502020204030204" pitchFamily="34" charset="0"/>
+                                      <a:cs typeface="Times New Roman" panose="02020603050405020304" pitchFamily="18" charset="0"/>
+                                    </a:rPr>
+                                    <m:t>𝑘</m:t>
+                                  </m:r>
+                                  <m:r>
+                                    <a:rPr lang="ru-RU" sz="2800" i="1">
+                                      <a:effectLst/>
+                                      <a:latin typeface="Cambria Math" panose="02040503050406030204" pitchFamily="18" charset="0"/>
+                                      <a:ea typeface="Calibri" panose="020F0502020204030204" pitchFamily="34" charset="0"/>
+                                      <a:cs typeface="Times New Roman" panose="02020603050405020304" pitchFamily="18" charset="0"/>
+                                    </a:rPr>
+                                    <m:t>=0</m:t>
+                                  </m:r>
+                                </m:sub>
+                                <m:sup>
+                                  <m:r>
+                                    <a:rPr lang="ru-RU" sz="2800" i="1">
+                                      <a:effectLst/>
+                                      <a:latin typeface="Cambria Math" panose="02040503050406030204" pitchFamily="18" charset="0"/>
+                                      <a:ea typeface="Calibri" panose="020F0502020204030204" pitchFamily="34" charset="0"/>
+                                      <a:cs typeface="Times New Roman" panose="02020603050405020304" pitchFamily="18" charset="0"/>
+                                    </a:rPr>
+                                    <m:t>𝐾</m:t>
+                                  </m:r>
+                                </m:sup>
+                                <m:e>
+                                  <m:sSub>
+                                    <m:sSubPr>
+                                      <m:ctrlPr>
+                                        <a:rPr lang="ru-RU" sz="2800" i="1">
+                                          <a:effectLst/>
+                                          <a:latin typeface="Cambria Math" panose="02040503050406030204" pitchFamily="18" charset="0"/>
+                                          <a:ea typeface="Calibri" panose="020F0502020204030204" pitchFamily="34" charset="0"/>
+                                          <a:cs typeface="Times New Roman" panose="02020603050405020304" pitchFamily="18" charset="0"/>
+                                        </a:rPr>
+                                      </m:ctrlPr>
+                                    </m:sSubPr>
+                                    <m:e>
+                                      <m:r>
+                                        <a:rPr lang="ru-RU" sz="2800" i="1">
+                                          <a:effectLst/>
+                                          <a:latin typeface="Cambria Math" panose="02040503050406030204" pitchFamily="18" charset="0"/>
+                                          <a:ea typeface="Calibri" panose="020F0502020204030204" pitchFamily="34" charset="0"/>
+                                          <a:cs typeface="Times New Roman" panose="02020603050405020304" pitchFamily="18" charset="0"/>
+                                        </a:rPr>
+                                        <m:t>𝑏</m:t>
+                                      </m:r>
+                                    </m:e>
+                                    <m:sub>
+                                      <m:r>
+                                        <a:rPr lang="ru-RU" sz="2800" i="1">
+                                          <a:effectLst/>
+                                          <a:latin typeface="Cambria Math" panose="02040503050406030204" pitchFamily="18" charset="0"/>
+                                          <a:ea typeface="Calibri" panose="020F0502020204030204" pitchFamily="34" charset="0"/>
+                                          <a:cs typeface="Times New Roman" panose="02020603050405020304" pitchFamily="18" charset="0"/>
+                                        </a:rPr>
+                                        <m:t>𝑘</m:t>
+                                      </m:r>
+                                      <m:r>
+                                        <a:rPr lang="en-US" sz="2800" b="0" i="1" smtClean="0">
+                                          <a:effectLst/>
+                                          <a:latin typeface="Cambria Math" panose="02040503050406030204" pitchFamily="18" charset="0"/>
+                                          <a:ea typeface="Calibri" panose="020F0502020204030204" pitchFamily="34" charset="0"/>
+                                          <a:cs typeface="Times New Roman" panose="02020603050405020304" pitchFamily="18" charset="0"/>
+                                        </a:rPr>
+                                        <m:t>𝑛</m:t>
+                                      </m:r>
+                                    </m:sub>
+                                  </m:sSub>
+                                  <m:r>
+                                    <a:rPr lang="ru-RU" sz="2800" i="1">
+                                      <a:effectLst/>
+                                      <a:latin typeface="Cambria Math" panose="02040503050406030204" pitchFamily="18" charset="0"/>
+                                      <a:ea typeface="Calibri" panose="020F0502020204030204" pitchFamily="34" charset="0"/>
+                                      <a:cs typeface="Times New Roman" panose="02020603050405020304" pitchFamily="18" charset="0"/>
+                                    </a:rPr>
+                                    <m:t>∙</m:t>
+                                  </m:r>
+                                  <m:sSup>
+                                    <m:sSupPr>
+                                      <m:ctrlPr>
+                                        <a:rPr lang="ru-RU" sz="2800" i="1">
+                                          <a:effectLst/>
+                                          <a:latin typeface="Cambria Math" panose="02040503050406030204" pitchFamily="18" charset="0"/>
+                                          <a:ea typeface="Calibri" panose="020F0502020204030204" pitchFamily="34" charset="0"/>
+                                          <a:cs typeface="Times New Roman" panose="02020603050405020304" pitchFamily="18" charset="0"/>
+                                        </a:rPr>
+                                      </m:ctrlPr>
+                                    </m:sSupPr>
+                                    <m:e>
+                                      <m:r>
+                                        <a:rPr lang="ru-RU" sz="2800" i="1">
+                                          <a:effectLst/>
+                                          <a:latin typeface="Cambria Math" panose="02040503050406030204" pitchFamily="18" charset="0"/>
+                                          <a:ea typeface="Calibri" panose="020F0502020204030204" pitchFamily="34" charset="0"/>
+                                          <a:cs typeface="Times New Roman" panose="02020603050405020304" pitchFamily="18" charset="0"/>
+                                        </a:rPr>
+                                        <m:t>𝑧</m:t>
+                                      </m:r>
+                                    </m:e>
+                                    <m:sup>
+                                      <m:r>
+                                        <a:rPr lang="ru-RU" sz="2800" i="1">
+                                          <a:effectLst/>
+                                          <a:latin typeface="Cambria Math" panose="02040503050406030204" pitchFamily="18" charset="0"/>
+                                          <a:ea typeface="Calibri" panose="020F0502020204030204" pitchFamily="34" charset="0"/>
+                                          <a:cs typeface="Times New Roman" panose="02020603050405020304" pitchFamily="18" charset="0"/>
+                                        </a:rPr>
+                                        <m:t>−</m:t>
+                                      </m:r>
+                                      <m:r>
+                                        <a:rPr lang="ru-RU" sz="2800" i="1">
+                                          <a:effectLst/>
+                                          <a:latin typeface="Cambria Math" panose="02040503050406030204" pitchFamily="18" charset="0"/>
+                                          <a:ea typeface="Calibri" panose="020F0502020204030204" pitchFamily="34" charset="0"/>
+                                          <a:cs typeface="Times New Roman" panose="02020603050405020304" pitchFamily="18" charset="0"/>
+                                        </a:rPr>
+                                        <m:t>𝑘</m:t>
+                                      </m:r>
+                                    </m:sup>
+                                  </m:sSup>
+                                </m:e>
+                              </m:nary>
+                            </m:den>
+                          </m:f>
+                        </m:e>
+                      </m:nary>
+                    </m:oMath>
+                  </m:oMathPara>
+                </a14:m>
+                <a:endParaRPr lang="en-US" dirty="0"/>
+              </a:p>
+              <a:p>
+                <a:pPr marL="0" indent="0">
+                  <a:buNone/>
+                </a:pPr>
+                <a:endParaRPr lang="ru-RU" i="1" dirty="0">
+                  <a:latin typeface="Cambria Math" panose="02040503050406030204" pitchFamily="18" charset="0"/>
+                  <a:ea typeface="Calibri" panose="020F0502020204030204" pitchFamily="34" charset="0"/>
+                  <a:cs typeface="Times New Roman" panose="02020603050405020304" pitchFamily="18" charset="0"/>
+                </a:endParaRPr>
+              </a:p>
+            </p:txBody>
+          </p:sp>
+        </mc:Choice>
+        <mc:Fallback>
+          <p:sp>
+            <p:nvSpPr>
+              <p:cNvPr id="3" name="Объект 2">
+                <a:extLst>
+                  <a:ext uri="{FF2B5EF4-FFF2-40B4-BE49-F238E27FC236}">
+                    <a16:creationId xmlns:a16="http://schemas.microsoft.com/office/drawing/2014/main" id="{3444A8FB-8DF5-4B08-819C-2D812BD402F2}"/>
+                  </a:ext>
+                </a:extLst>
+              </p:cNvPr>
+              <p:cNvSpPr>
+                <a:spLocks noGrp="1" noRot="1" noChangeAspect="1" noMove="1" noResize="1" noEditPoints="1" noAdjustHandles="1" noChangeArrowheads="1" noChangeShapeType="1" noTextEdit="1"/>
+              </p:cNvSpPr>
+              <p:nvPr>
+                <p:ph idx="1"/>
+              </p:nvPr>
+            </p:nvSpPr>
+            <p:spPr>
+              <a:blipFill>
+                <a:blip r:embed="rId2"/>
+                <a:stretch>
+                  <a:fillRect/>
+                </a:stretch>
+              </a:blipFill>
+            </p:spPr>
+            <p:txBody>
+              <a:bodyPr/>
+              <a:lstStyle/>
+              <a:p>
+                <a:r>
+                  <a:rPr lang="ru-RU">
+                    <a:noFill/>
+                  </a:rPr>
+                  <a:t> </a:t>
+                </a:r>
+              </a:p>
+            </p:txBody>
+          </p:sp>
+        </mc:Fallback>
+      </mc:AlternateContent>
+    </p:spTree>
+    <p:extLst>
+      <p:ext uri="{BB962C8B-B14F-4D97-AF65-F5344CB8AC3E}">
+        <p14:creationId xmlns:p14="http://schemas.microsoft.com/office/powerpoint/2010/main" val="2940452693"/>
+      </p:ext>
+    </p:extLst>
+  </p:cSld>
+  <p:clrMapOvr>
+    <a:masterClrMapping/>
+  </p:clrMapOvr>
+</p:sld>
+</file>
+
+<file path=ppt/slides/slide6.xml><?xml version="1.0" encoding="utf-8"?>
+<p:sld xmlns:a="http://schemas.openxmlformats.org/drawingml/2006/main" xmlns:r="http://schemas.openxmlformats.org/officeDocument/2006/relationships" xmlns:p="http://schemas.openxmlformats.org/presentationml/2006/main">
+  <p:cSld>
+    <p:spTree>
+      <p:nvGrpSpPr>
+        <p:cNvPr id="1" name=""/>
+        <p:cNvGrpSpPr/>
+        <p:nvPr/>
+      </p:nvGrpSpPr>
+      <p:grpSpPr>
+        <a:xfrm>
+          <a:off x="0" y="0"/>
+          <a:ext cx="0" cy="0"/>
+          <a:chOff x="0" y="0"/>
+          <a:chExt cx="0" cy="0"/>
+        </a:xfrm>
+      </p:grpSpPr>
+      <p:sp>
+        <p:nvSpPr>
+          <p:cNvPr id="2" name="Заголовок 1">
+            <a:extLst>
+              <a:ext uri="{FF2B5EF4-FFF2-40B4-BE49-F238E27FC236}">
                 <a16:creationId xmlns:a16="http://schemas.microsoft.com/office/drawing/2014/main" id="{1CCD776C-98F5-44AB-B26E-4F35C3A73FDC}"/>
               </a:ext>
             </a:extLst>
@@ -4540,7 +5131,7 @@
 </p:sld>
 </file>
 
-<file path=ppt/slides/slide6.xml><?xml version="1.0" encoding="utf-8"?>
+<file path=ppt/slides/slide7.xml><?xml version="1.0" encoding="utf-8"?>
 <p:sld xmlns:a="http://schemas.openxmlformats.org/drawingml/2006/main" xmlns:r="http://schemas.openxmlformats.org/officeDocument/2006/relationships" xmlns:p="http://schemas.openxmlformats.org/presentationml/2006/main">
   <p:cSld>
     <p:spTree>
@@ -4886,7 +5477,7 @@
 </p:sld>
 </file>
 
-<file path=ppt/slides/slide7.xml><?xml version="1.0" encoding="utf-8"?>
+<file path=ppt/slides/slide8.xml><?xml version="1.0" encoding="utf-8"?>
 <p:sld xmlns:a="http://schemas.openxmlformats.org/drawingml/2006/main" xmlns:r="http://schemas.openxmlformats.org/officeDocument/2006/relationships" xmlns:p="http://schemas.openxmlformats.org/presentationml/2006/main">
   <p:cSld>
     <p:spTree>

</xml_diff>